<commit_message>
Working version (to be tested)
24/09/2020
This is the first working version of the package. The very basic functions are implemented. You can compute the error vectors, the cosine maps, run a permutation analysis, and estimate the parameters of the CAM model.
There are a couple of tutorials with a recangle and a circle shapes (see the Tutorials folder) . In future, I will need to test the toolbox with other types of shapes or objects.
</commit_message>
<xml_diff>
--- a/Info.pptx
+++ b/Info.pptx
@@ -5,11 +5,12 @@
     <p:sldMasterId id="2147483648" r:id="rId1"/>
   </p:sldMasterIdLst>
   <p:notesMasterIdLst>
-    <p:notesMasterId r:id="rId4"/>
+    <p:notesMasterId r:id="rId5"/>
   </p:notesMasterIdLst>
   <p:sldIdLst>
     <p:sldId id="256" r:id="rId2"/>
     <p:sldId id="257" r:id="rId3"/>
+    <p:sldId id="258" r:id="rId4"/>
   </p:sldIdLst>
   <p:sldSz cx="12192000" cy="6858000"/>
   <p:notesSz cx="6858000" cy="9144000"/>
@@ -209,7 +210,7 @@
           <a:p>
             <a:fld id="{5A1C56CD-DFE4-4706-AB3D-08F12624B462}" type="datetimeFigureOut">
               <a:rPr lang="en-GB" smtClean="0"/>
-              <a:t>15/09/2020</a:t>
+              <a:t>24/09/2020</a:t>
             </a:fld>
             <a:endParaRPr lang="en-GB"/>
           </a:p>
@@ -1439,6 +1440,487 @@
 </p:notes>
 </file>
 
+<file path=ppt/notesSlides/notesSlide3.xml><?xml version="1.0" encoding="utf-8"?>
+<p:notes xmlns:a="http://schemas.openxmlformats.org/drawingml/2006/main" xmlns:r="http://schemas.openxmlformats.org/officeDocument/2006/relationships" xmlns:p="http://schemas.openxmlformats.org/presentationml/2006/main">
+  <p:cSld>
+    <p:spTree>
+      <p:nvGrpSpPr>
+        <p:cNvPr id="1" name=""/>
+        <p:cNvGrpSpPr/>
+        <p:nvPr/>
+      </p:nvGrpSpPr>
+      <p:grpSpPr>
+        <a:xfrm>
+          <a:off x="0" y="0"/>
+          <a:ext cx="0" cy="0"/>
+          <a:chOff x="0" y="0"/>
+          <a:chExt cx="0" cy="0"/>
+        </a:xfrm>
+      </p:grpSpPr>
+      <p:sp>
+        <p:nvSpPr>
+          <p:cNvPr id="2" name="Slide Image Placeholder 1"/>
+          <p:cNvSpPr>
+            <a:spLocks noGrp="1" noRot="1" noChangeAspect="1"/>
+          </p:cNvSpPr>
+          <p:nvPr>
+            <p:ph type="sldImg"/>
+          </p:nvPr>
+        </p:nvSpPr>
+        <p:spPr/>
+      </p:sp>
+      <p:sp>
+        <p:nvSpPr>
+          <p:cNvPr id="3" name="Notes Placeholder 2"/>
+          <p:cNvSpPr>
+            <a:spLocks noGrp="1"/>
+          </p:cNvSpPr>
+          <p:nvPr>
+            <p:ph type="body" idx="1"/>
+          </p:nvPr>
+        </p:nvSpPr>
+        <p:spPr/>
+        <p:txBody>
+          <a:bodyPr/>
+          <a:lstStyle/>
+          <a:p>
+            <a:r>
+              <a:rPr lang="en-GB" sz="1200" b="0" i="0" u="none" strike="noStrike" kern="1200" baseline="0" dirty="0" smtClean="0">
+                <a:solidFill>
+                  <a:schemeClr val="tx1"/>
+                </a:solidFill>
+                <a:latin typeface="+mn-lt"/>
+                <a:ea typeface="+mn-ea"/>
+                <a:cs typeface="+mn-cs"/>
+              </a:rPr>
+              <a:t>This information are stored within the </a:t>
+            </a:r>
+            <a:r>
+              <a:rPr lang="en-GB" sz="1200" b="0" i="0" u="none" strike="noStrike" kern="1200" baseline="0" dirty="0" err="1" smtClean="0">
+                <a:solidFill>
+                  <a:schemeClr val="tx1"/>
+                </a:solidFill>
+                <a:latin typeface="+mn-lt"/>
+                <a:ea typeface="+mn-ea"/>
+                <a:cs typeface="+mn-cs"/>
+              </a:rPr>
+              <a:t>prototable</a:t>
+            </a:r>
+            <a:r>
+              <a:rPr lang="en-GB" sz="1200" b="0" i="0" u="none" strike="noStrike" kern="1200" baseline="0" dirty="0" smtClean="0">
+                <a:solidFill>
+                  <a:schemeClr val="tx1"/>
+                </a:solidFill>
+                <a:latin typeface="+mn-lt"/>
+                <a:ea typeface="+mn-ea"/>
+                <a:cs typeface="+mn-cs"/>
+              </a:rPr>
+              <a:t> and the cosine map structure in the field .</a:t>
+            </a:r>
+            <a:r>
+              <a:rPr lang="en-GB" sz="1200" b="0" i="0" u="none" strike="noStrike" kern="1200" baseline="0" dirty="0" err="1" smtClean="0">
+                <a:solidFill>
+                  <a:schemeClr val="tx1"/>
+                </a:solidFill>
+                <a:latin typeface="+mn-lt"/>
+                <a:ea typeface="+mn-ea"/>
+                <a:cs typeface="+mn-cs"/>
+              </a:rPr>
+              <a:t>Properties.UserData</a:t>
+            </a:r>
+            <a:r>
+              <a:rPr lang="en-GB" sz="1200" b="0" i="0" u="none" strike="noStrike" kern="1200" baseline="0" dirty="0" smtClean="0">
+                <a:solidFill>
+                  <a:schemeClr val="tx1"/>
+                </a:solidFill>
+                <a:latin typeface="+mn-lt"/>
+                <a:ea typeface="+mn-ea"/>
+                <a:cs typeface="+mn-cs"/>
+              </a:rPr>
+              <a:t>.</a:t>
+            </a:r>
+          </a:p>
+          <a:p>
+            <a:endParaRPr lang="en-GB" sz="1200" b="0" i="0" u="none" strike="noStrike" kern="1200" baseline="0" dirty="0" smtClean="0">
+              <a:solidFill>
+                <a:schemeClr val="tx1"/>
+              </a:solidFill>
+              <a:latin typeface="+mn-lt"/>
+              <a:ea typeface="+mn-ea"/>
+              <a:cs typeface="+mn-cs"/>
+            </a:endParaRPr>
+          </a:p>
+          <a:p>
+            <a:endParaRPr lang="en-GB" sz="1200" b="0" i="0" u="none" strike="noStrike" kern="1200" baseline="0" dirty="0" smtClean="0">
+              <a:solidFill>
+                <a:schemeClr val="tx1"/>
+              </a:solidFill>
+              <a:latin typeface="+mn-lt"/>
+              <a:ea typeface="+mn-ea"/>
+              <a:cs typeface="+mn-cs"/>
+            </a:endParaRPr>
+          </a:p>
+          <a:p>
+            <a:r>
+              <a:rPr lang="en-GB" sz="1200" b="1" i="0" u="sng" strike="noStrike" kern="1200" baseline="0" dirty="0" smtClean="0">
+                <a:solidFill>
+                  <a:schemeClr val="tx1"/>
+                </a:solidFill>
+                <a:latin typeface="+mn-lt"/>
+                <a:ea typeface="+mn-ea"/>
+                <a:cs typeface="+mn-cs"/>
+              </a:rPr>
+              <a:t>Example of .</a:t>
+            </a:r>
+            <a:r>
+              <a:rPr lang="en-GB" sz="1200" b="1" i="0" u="sng" strike="noStrike" kern="1200" baseline="0" dirty="0" err="1" smtClean="0">
+                <a:solidFill>
+                  <a:schemeClr val="tx1"/>
+                </a:solidFill>
+                <a:latin typeface="+mn-lt"/>
+                <a:ea typeface="+mn-ea"/>
+                <a:cs typeface="+mn-cs"/>
+              </a:rPr>
+              <a:t>Properties.UserData</a:t>
+            </a:r>
+            <a:endParaRPr lang="en-GB" sz="1200" b="1" i="0" u="sng" strike="noStrike" kern="1200" baseline="0" dirty="0" smtClean="0">
+              <a:solidFill>
+                <a:schemeClr val="tx1"/>
+              </a:solidFill>
+              <a:latin typeface="+mn-lt"/>
+              <a:ea typeface="+mn-ea"/>
+              <a:cs typeface="+mn-cs"/>
+            </a:endParaRPr>
+          </a:p>
+          <a:p>
+            <a:r>
+              <a:rPr lang="en-GB" sz="1200" b="0" i="0" u="none" strike="noStrike" kern="1200" baseline="0" dirty="0" err="1" smtClean="0">
+                <a:solidFill>
+                  <a:schemeClr val="tx1"/>
+                </a:solidFill>
+                <a:latin typeface="+mn-lt"/>
+                <a:ea typeface="+mn-ea"/>
+                <a:cs typeface="+mn-cs"/>
+              </a:rPr>
+              <a:t>ScreenRect</a:t>
+            </a:r>
+            <a:r>
+              <a:rPr lang="en-GB" sz="1200" b="0" i="0" u="none" strike="noStrike" kern="1200" baseline="0" dirty="0" smtClean="0">
+                <a:solidFill>
+                  <a:schemeClr val="tx1"/>
+                </a:solidFill>
+                <a:latin typeface="+mn-lt"/>
+                <a:ea typeface="+mn-ea"/>
+                <a:cs typeface="+mn-cs"/>
+              </a:rPr>
+              <a:t>: [1 1 1920 1080]</a:t>
+            </a:r>
+          </a:p>
+          <a:p>
+            <a:r>
+              <a:rPr lang="en-GB" sz="1200" b="0" i="0" u="none" strike="noStrike" kern="1200" baseline="0" dirty="0" err="1" smtClean="0">
+                <a:solidFill>
+                  <a:schemeClr val="tx1"/>
+                </a:solidFill>
+                <a:latin typeface="+mn-lt"/>
+                <a:ea typeface="+mn-ea"/>
+                <a:cs typeface="+mn-cs"/>
+              </a:rPr>
+              <a:t>ShapeContainerRect</a:t>
+            </a:r>
+            <a:r>
+              <a:rPr lang="en-GB" sz="1200" b="0" i="0" u="none" strike="noStrike" kern="1200" baseline="0" dirty="0" smtClean="0">
+                <a:solidFill>
+                  <a:schemeClr val="tx1"/>
+                </a:solidFill>
+                <a:latin typeface="+mn-lt"/>
+                <a:ea typeface="+mn-ea"/>
+                <a:cs typeface="+mn-cs"/>
+              </a:rPr>
+              <a:t>: [-70 -70 770 770]   		% this can be equal to </a:t>
+            </a:r>
+            <a:r>
+              <a:rPr lang="en-GB" sz="1200" b="0" i="0" u="none" strike="noStrike" kern="1200" baseline="0" dirty="0" err="1" smtClean="0">
+                <a:solidFill>
+                  <a:schemeClr val="tx1"/>
+                </a:solidFill>
+                <a:latin typeface="+mn-lt"/>
+                <a:ea typeface="+mn-ea"/>
+                <a:cs typeface="+mn-cs"/>
+              </a:rPr>
+              <a:t>ShapeRect</a:t>
+            </a:r>
+            <a:r>
+              <a:rPr lang="en-GB" sz="1200" b="0" i="0" u="none" strike="noStrike" kern="1200" baseline="0" dirty="0" smtClean="0">
+                <a:solidFill>
+                  <a:schemeClr val="tx1"/>
+                </a:solidFill>
+                <a:latin typeface="+mn-lt"/>
+                <a:ea typeface="+mn-ea"/>
+                <a:cs typeface="+mn-cs"/>
+              </a:rPr>
+              <a:t> if you do not want to have space outside the shape</a:t>
+            </a:r>
+          </a:p>
+          <a:p>
+            <a:r>
+              <a:rPr lang="en-GB" sz="1200" b="0" i="0" u="none" strike="noStrike" kern="1200" baseline="0" dirty="0" err="1" smtClean="0">
+                <a:solidFill>
+                  <a:schemeClr val="tx1"/>
+                </a:solidFill>
+                <a:latin typeface="+mn-lt"/>
+                <a:ea typeface="+mn-ea"/>
+                <a:cs typeface="+mn-cs"/>
+              </a:rPr>
+              <a:t>ShapeRect</a:t>
+            </a:r>
+            <a:r>
+              <a:rPr lang="en-GB" sz="1200" b="0" i="0" u="none" strike="noStrike" kern="1200" baseline="0" dirty="0" smtClean="0">
+                <a:solidFill>
+                  <a:schemeClr val="tx1"/>
+                </a:solidFill>
+                <a:latin typeface="+mn-lt"/>
+                <a:ea typeface="+mn-ea"/>
+                <a:cs typeface="+mn-cs"/>
+              </a:rPr>
+              <a:t>: [0 0 700 700]</a:t>
+            </a:r>
+          </a:p>
+          <a:p>
+            <a:r>
+              <a:rPr lang="en-GB" sz="1200" b="0" i="0" u="none" strike="noStrike" kern="1200" baseline="0" dirty="0" err="1" smtClean="0">
+                <a:solidFill>
+                  <a:schemeClr val="tx1"/>
+                </a:solidFill>
+                <a:latin typeface="+mn-lt"/>
+                <a:ea typeface="+mn-ea"/>
+                <a:cs typeface="+mn-cs"/>
+              </a:rPr>
+              <a:t>YDir</a:t>
+            </a:r>
+            <a:r>
+              <a:rPr lang="en-GB" sz="1200" b="0" i="0" u="none" strike="noStrike" kern="1200" baseline="0" dirty="0" smtClean="0">
+                <a:solidFill>
+                  <a:schemeClr val="tx1"/>
+                </a:solidFill>
+                <a:latin typeface="+mn-lt"/>
+                <a:ea typeface="+mn-ea"/>
+                <a:cs typeface="+mn-cs"/>
+              </a:rPr>
+              <a:t>: 'normal‘				% direction of plot for the Y axis (note that this vary depending on the type of plots)	</a:t>
+            </a:r>
+          </a:p>
+          <a:p>
+            <a:r>
+              <a:rPr lang="en-GB" sz="1200" b="0" i="0" u="none" strike="noStrike" kern="1200" baseline="0" dirty="0" smtClean="0">
+                <a:solidFill>
+                  <a:schemeClr val="tx1"/>
+                </a:solidFill>
+                <a:latin typeface="+mn-lt"/>
+                <a:ea typeface="+mn-ea"/>
+                <a:cs typeface="+mn-cs"/>
+              </a:rPr>
+              <a:t>Experiment: 'Synthetic data‘ 			% experiment name</a:t>
+            </a:r>
+          </a:p>
+          <a:p>
+            <a:r>
+              <a:rPr lang="en-GB" sz="1200" b="0" i="0" u="none" strike="noStrike" kern="1200" baseline="0" dirty="0" err="1" smtClean="0">
+                <a:solidFill>
+                  <a:schemeClr val="tx1"/>
+                </a:solidFill>
+                <a:latin typeface="+mn-lt"/>
+                <a:ea typeface="+mn-ea"/>
+                <a:cs typeface="+mn-cs"/>
+              </a:rPr>
+              <a:t>StimulusType</a:t>
+            </a:r>
+            <a:r>
+              <a:rPr lang="en-GB" sz="1200" b="0" i="0" u="none" strike="noStrike" kern="1200" baseline="0" dirty="0" smtClean="0">
+                <a:solidFill>
+                  <a:schemeClr val="tx1"/>
+                </a:solidFill>
+                <a:latin typeface="+mn-lt"/>
+                <a:ea typeface="+mn-ea"/>
+                <a:cs typeface="+mn-cs"/>
+              </a:rPr>
+              <a:t>: 'Square data'</a:t>
+            </a:r>
+          </a:p>
+          <a:p>
+            <a:r>
+              <a:rPr lang="en-GB" sz="1200" b="0" i="0" u="none" strike="noStrike" kern="1200" baseline="0" dirty="0" err="1" smtClean="0">
+                <a:solidFill>
+                  <a:schemeClr val="tx1"/>
+                </a:solidFill>
+                <a:latin typeface="+mn-lt"/>
+                <a:ea typeface="+mn-ea"/>
+                <a:cs typeface="+mn-cs"/>
+              </a:rPr>
+              <a:t>StimulusFileName</a:t>
+            </a:r>
+            <a:r>
+              <a:rPr lang="en-GB" sz="1200" b="0" i="0" u="none" strike="noStrike" kern="1200" baseline="0" dirty="0" smtClean="0">
+                <a:solidFill>
+                  <a:schemeClr val="tx1"/>
+                </a:solidFill>
+                <a:latin typeface="+mn-lt"/>
+                <a:ea typeface="+mn-ea"/>
+                <a:cs typeface="+mn-cs"/>
+              </a:rPr>
+              <a:t>: ''</a:t>
+            </a:r>
+          </a:p>
+          <a:p>
+            <a:r>
+              <a:rPr lang="en-GB" sz="1200" b="0" i="0" u="none" strike="noStrike" kern="1200" baseline="0" dirty="0" err="1" smtClean="0">
+                <a:solidFill>
+                  <a:schemeClr val="tx1"/>
+                </a:solidFill>
+                <a:latin typeface="+mn-lt"/>
+                <a:ea typeface="+mn-ea"/>
+                <a:cs typeface="+mn-cs"/>
+              </a:rPr>
+              <a:t>FolderName</a:t>
+            </a:r>
+            <a:r>
+              <a:rPr lang="en-GB" sz="1200" b="0" i="0" u="none" strike="noStrike" kern="1200" baseline="0" dirty="0" smtClean="0">
+                <a:solidFill>
+                  <a:schemeClr val="tx1"/>
+                </a:solidFill>
+                <a:latin typeface="+mn-lt"/>
+                <a:ea typeface="+mn-ea"/>
+                <a:cs typeface="+mn-cs"/>
+              </a:rPr>
+              <a:t>: ''</a:t>
+            </a:r>
+          </a:p>
+          <a:p>
+            <a:r>
+              <a:rPr lang="en-GB" sz="1200" b="0" i="0" u="none" strike="noStrike" kern="1200" baseline="0" dirty="0" err="1" smtClean="0">
+                <a:solidFill>
+                  <a:schemeClr val="tx1"/>
+                </a:solidFill>
+                <a:latin typeface="+mn-lt"/>
+                <a:ea typeface="+mn-ea"/>
+                <a:cs typeface="+mn-cs"/>
+              </a:rPr>
+              <a:t>FileName</a:t>
+            </a:r>
+            <a:r>
+              <a:rPr lang="en-GB" sz="1200" b="0" i="0" u="none" strike="noStrike" kern="1200" baseline="0" dirty="0" smtClean="0">
+                <a:solidFill>
+                  <a:schemeClr val="tx1"/>
+                </a:solidFill>
+                <a:latin typeface="+mn-lt"/>
+                <a:ea typeface="+mn-ea"/>
+                <a:cs typeface="+mn-cs"/>
+              </a:rPr>
+              <a:t>: ''</a:t>
+            </a:r>
+          </a:p>
+          <a:p>
+            <a:r>
+              <a:rPr lang="en-GB" sz="1200" b="0" i="0" u="none" strike="noStrike" kern="1200" baseline="0" dirty="0" err="1" smtClean="0">
+                <a:solidFill>
+                  <a:schemeClr val="tx1"/>
+                </a:solidFill>
+                <a:latin typeface="+mn-lt"/>
+                <a:ea typeface="+mn-ea"/>
+                <a:cs typeface="+mn-cs"/>
+              </a:rPr>
+              <a:t>ScreenDepth</a:t>
+            </a:r>
+            <a:r>
+              <a:rPr lang="en-GB" sz="1200" b="0" i="0" u="none" strike="noStrike" kern="1200" baseline="0" dirty="0" smtClean="0">
+                <a:solidFill>
+                  <a:schemeClr val="tx1"/>
+                </a:solidFill>
+                <a:latin typeface="+mn-lt"/>
+                <a:ea typeface="+mn-ea"/>
+                <a:cs typeface="+mn-cs"/>
+              </a:rPr>
+              <a:t>: 32</a:t>
+            </a:r>
+          </a:p>
+          <a:p>
+            <a:r>
+              <a:rPr lang="en-GB" sz="1200" b="0" i="0" u="none" strike="noStrike" kern="1200" baseline="0" dirty="0" err="1" smtClean="0">
+                <a:solidFill>
+                  <a:schemeClr val="tx1"/>
+                </a:solidFill>
+                <a:latin typeface="+mn-lt"/>
+                <a:ea typeface="+mn-ea"/>
+                <a:cs typeface="+mn-cs"/>
+              </a:rPr>
+              <a:t>ScreenPixelsPerInch</a:t>
+            </a:r>
+            <a:r>
+              <a:rPr lang="en-GB" sz="1200" b="0" i="0" u="none" strike="noStrike" kern="1200" baseline="0" dirty="0" smtClean="0">
+                <a:solidFill>
+                  <a:schemeClr val="tx1"/>
+                </a:solidFill>
+                <a:latin typeface="+mn-lt"/>
+                <a:ea typeface="+mn-ea"/>
+                <a:cs typeface="+mn-cs"/>
+              </a:rPr>
+              <a:t>: 96</a:t>
+            </a:r>
+          </a:p>
+          <a:p>
+            <a:r>
+              <a:rPr lang="en-GB" sz="1200" b="0" i="0" u="none" strike="noStrike" kern="1200" baseline="0" dirty="0" smtClean="0">
+                <a:solidFill>
+                  <a:schemeClr val="tx1"/>
+                </a:solidFill>
+                <a:latin typeface="+mn-lt"/>
+                <a:ea typeface="+mn-ea"/>
+                <a:cs typeface="+mn-cs"/>
+              </a:rPr>
+              <a:t>Units: 'pixels'</a:t>
+            </a:r>
+          </a:p>
+          <a:p>
+            <a:endParaRPr lang="en-GB" dirty="0"/>
+          </a:p>
+        </p:txBody>
+      </p:sp>
+      <p:sp>
+        <p:nvSpPr>
+          <p:cNvPr id="4" name="Slide Number Placeholder 3"/>
+          <p:cNvSpPr>
+            <a:spLocks noGrp="1"/>
+          </p:cNvSpPr>
+          <p:nvPr>
+            <p:ph type="sldNum" sz="quarter" idx="10"/>
+          </p:nvPr>
+        </p:nvSpPr>
+        <p:spPr/>
+        <p:txBody>
+          <a:bodyPr/>
+          <a:lstStyle/>
+          <a:p>
+            <a:fld id="{F5ED6A68-A4AE-40FF-804B-17D8353E52E0}" type="slidenum">
+              <a:rPr lang="en-GB" smtClean="0"/>
+              <a:t>3</a:t>
+            </a:fld>
+            <a:endParaRPr lang="en-GB"/>
+          </a:p>
+        </p:txBody>
+      </p:sp>
+    </p:spTree>
+    <p:extLst>
+      <p:ext uri="{BB962C8B-B14F-4D97-AF65-F5344CB8AC3E}">
+        <p14:creationId xmlns:p14="http://schemas.microsoft.com/office/powerpoint/2010/main" val="350362034"/>
+      </p:ext>
+    </p:extLst>
+  </p:cSld>
+  <p:clrMapOvr>
+    <a:masterClrMapping/>
+  </p:clrMapOvr>
+</p:notes>
+</file>
+
 <file path=ppt/slideLayouts/slideLayout1.xml><?xml version="1.0" encoding="utf-8"?>
 <p:sldLayout xmlns:a="http://schemas.openxmlformats.org/drawingml/2006/main" xmlns:r="http://schemas.openxmlformats.org/officeDocument/2006/relationships" xmlns:p="http://schemas.openxmlformats.org/presentationml/2006/main" type="title" preserve="1">
   <p:cSld name="Title Slide">
@@ -1570,7 +2052,7 @@
           <a:p>
             <a:fld id="{EC84DC15-A4F1-4D49-B07D-D116C3BF0CF0}" type="datetimeFigureOut">
               <a:rPr lang="en-GB" smtClean="0"/>
-              <a:t>15/09/2020</a:t>
+              <a:t>24/09/2020</a:t>
             </a:fld>
             <a:endParaRPr lang="en-GB"/>
           </a:p>
@@ -1740,7 +2222,7 @@
           <a:p>
             <a:fld id="{EC84DC15-A4F1-4D49-B07D-D116C3BF0CF0}" type="datetimeFigureOut">
               <a:rPr lang="en-GB" smtClean="0"/>
-              <a:t>15/09/2020</a:t>
+              <a:t>24/09/2020</a:t>
             </a:fld>
             <a:endParaRPr lang="en-GB"/>
           </a:p>
@@ -1920,7 +2402,7 @@
           <a:p>
             <a:fld id="{EC84DC15-A4F1-4D49-B07D-D116C3BF0CF0}" type="datetimeFigureOut">
               <a:rPr lang="en-GB" smtClean="0"/>
-              <a:t>15/09/2020</a:t>
+              <a:t>24/09/2020</a:t>
             </a:fld>
             <a:endParaRPr lang="en-GB"/>
           </a:p>
@@ -2090,7 +2572,7 @@
           <a:p>
             <a:fld id="{EC84DC15-A4F1-4D49-B07D-D116C3BF0CF0}" type="datetimeFigureOut">
               <a:rPr lang="en-GB" smtClean="0"/>
-              <a:t>15/09/2020</a:t>
+              <a:t>24/09/2020</a:t>
             </a:fld>
             <a:endParaRPr lang="en-GB"/>
           </a:p>
@@ -2336,7 +2818,7 @@
           <a:p>
             <a:fld id="{EC84DC15-A4F1-4D49-B07D-D116C3BF0CF0}" type="datetimeFigureOut">
               <a:rPr lang="en-GB" smtClean="0"/>
-              <a:t>15/09/2020</a:t>
+              <a:t>24/09/2020</a:t>
             </a:fld>
             <a:endParaRPr lang="en-GB"/>
           </a:p>
@@ -2568,7 +3050,7 @@
           <a:p>
             <a:fld id="{EC84DC15-A4F1-4D49-B07D-D116C3BF0CF0}" type="datetimeFigureOut">
               <a:rPr lang="en-GB" smtClean="0"/>
-              <a:t>15/09/2020</a:t>
+              <a:t>24/09/2020</a:t>
             </a:fld>
             <a:endParaRPr lang="en-GB"/>
           </a:p>
@@ -2935,7 +3417,7 @@
           <a:p>
             <a:fld id="{EC84DC15-A4F1-4D49-B07D-D116C3BF0CF0}" type="datetimeFigureOut">
               <a:rPr lang="en-GB" smtClean="0"/>
-              <a:t>15/09/2020</a:t>
+              <a:t>24/09/2020</a:t>
             </a:fld>
             <a:endParaRPr lang="en-GB"/>
           </a:p>
@@ -3053,7 +3535,7 @@
           <a:p>
             <a:fld id="{EC84DC15-A4F1-4D49-B07D-D116C3BF0CF0}" type="datetimeFigureOut">
               <a:rPr lang="en-GB" smtClean="0"/>
-              <a:t>15/09/2020</a:t>
+              <a:t>24/09/2020</a:t>
             </a:fld>
             <a:endParaRPr lang="en-GB"/>
           </a:p>
@@ -3148,7 +3630,7 @@
           <a:p>
             <a:fld id="{EC84DC15-A4F1-4D49-B07D-D116C3BF0CF0}" type="datetimeFigureOut">
               <a:rPr lang="en-GB" smtClean="0"/>
-              <a:t>15/09/2020</a:t>
+              <a:t>24/09/2020</a:t>
             </a:fld>
             <a:endParaRPr lang="en-GB"/>
           </a:p>
@@ -3425,7 +3907,7 @@
           <a:p>
             <a:fld id="{EC84DC15-A4F1-4D49-B07D-D116C3BF0CF0}" type="datetimeFigureOut">
               <a:rPr lang="en-GB" smtClean="0"/>
-              <a:t>15/09/2020</a:t>
+              <a:t>24/09/2020</a:t>
             </a:fld>
             <a:endParaRPr lang="en-GB"/>
           </a:p>
@@ -3678,7 +4160,7 @@
           <a:p>
             <a:fld id="{EC84DC15-A4F1-4D49-B07D-D116C3BF0CF0}" type="datetimeFigureOut">
               <a:rPr lang="en-GB" smtClean="0"/>
-              <a:t>15/09/2020</a:t>
+              <a:t>24/09/2020</a:t>
             </a:fld>
             <a:endParaRPr lang="en-GB"/>
           </a:p>
@@ -3891,7 +4373,7 @@
           <a:p>
             <a:fld id="{EC84DC15-A4F1-4D49-B07D-D116C3BF0CF0}" type="datetimeFigureOut">
               <a:rPr lang="en-GB" smtClean="0"/>
-              <a:t>15/09/2020</a:t>
+              <a:t>24/09/2020</a:t>
             </a:fld>
             <a:endParaRPr lang="en-GB"/>
           </a:p>
@@ -6719,6 +7201,484 @@
 </p:sld>
 </file>
 
+<file path=ppt/slides/slide3.xml><?xml version="1.0" encoding="utf-8"?>
+<p:sld xmlns:a="http://schemas.openxmlformats.org/drawingml/2006/main" xmlns:r="http://schemas.openxmlformats.org/officeDocument/2006/relationships" xmlns:p="http://schemas.openxmlformats.org/presentationml/2006/main">
+  <p:cSld>
+    <p:spTree>
+      <p:nvGrpSpPr>
+        <p:cNvPr id="1" name=""/>
+        <p:cNvGrpSpPr/>
+        <p:nvPr/>
+      </p:nvGrpSpPr>
+      <p:grpSpPr>
+        <a:xfrm>
+          <a:off x="0" y="0"/>
+          <a:ext cx="0" cy="0"/>
+          <a:chOff x="0" y="0"/>
+          <a:chExt cx="0" cy="0"/>
+        </a:xfrm>
+      </p:grpSpPr>
+      <p:sp>
+        <p:nvSpPr>
+          <p:cNvPr id="4" name="Rectangle 3"/>
+          <p:cNvSpPr/>
+          <p:nvPr/>
+        </p:nvSpPr>
+        <p:spPr>
+          <a:xfrm>
+            <a:off x="696000" y="729000"/>
+            <a:ext cx="10800000" cy="5400000"/>
+          </a:xfrm>
+          <a:prstGeom prst="rect">
+            <a:avLst/>
+          </a:prstGeom>
+          <a:solidFill>
+            <a:schemeClr val="bg1">
+              <a:lumMod val="85000"/>
+            </a:schemeClr>
+          </a:solidFill>
+          <a:ln w="127000"/>
+        </p:spPr>
+        <p:style>
+          <a:lnRef idx="2">
+            <a:schemeClr val="dk1"/>
+          </a:lnRef>
+          <a:fillRef idx="1">
+            <a:schemeClr val="lt1"/>
+          </a:fillRef>
+          <a:effectRef idx="0">
+            <a:schemeClr val="dk1"/>
+          </a:effectRef>
+          <a:fontRef idx="minor">
+            <a:schemeClr val="dk1"/>
+          </a:fontRef>
+        </p:style>
+        <p:txBody>
+          <a:bodyPr rtlCol="0" anchor="ctr"/>
+          <a:lstStyle/>
+          <a:p>
+            <a:pPr algn="ctr"/>
+            <a:endParaRPr lang="en-GB"/>
+          </a:p>
+        </p:txBody>
+      </p:sp>
+      <p:sp>
+        <p:nvSpPr>
+          <p:cNvPr id="5" name="Rectangle 4"/>
+          <p:cNvSpPr/>
+          <p:nvPr/>
+        </p:nvSpPr>
+        <p:spPr>
+          <a:xfrm>
+            <a:off x="2314575" y="1304925"/>
+            <a:ext cx="1514476" cy="1476375"/>
+          </a:xfrm>
+          <a:prstGeom prst="rect">
+            <a:avLst/>
+          </a:prstGeom>
+          <a:ln>
+            <a:prstDash val="dash"/>
+          </a:ln>
+        </p:spPr>
+        <p:style>
+          <a:lnRef idx="2">
+            <a:schemeClr val="dk1"/>
+          </a:lnRef>
+          <a:fillRef idx="1">
+            <a:schemeClr val="lt1"/>
+          </a:fillRef>
+          <a:effectRef idx="0">
+            <a:schemeClr val="dk1"/>
+          </a:effectRef>
+          <a:fontRef idx="minor">
+            <a:schemeClr val="dk1"/>
+          </a:fontRef>
+        </p:style>
+        <p:txBody>
+          <a:bodyPr rtlCol="0" anchor="ctr"/>
+          <a:lstStyle/>
+          <a:p>
+            <a:pPr algn="ctr"/>
+            <a:endParaRPr lang="en-GB"/>
+          </a:p>
+        </p:txBody>
+      </p:sp>
+      <p:sp>
+        <p:nvSpPr>
+          <p:cNvPr id="6" name="Rectangle 5"/>
+          <p:cNvSpPr/>
+          <p:nvPr/>
+        </p:nvSpPr>
+        <p:spPr>
+          <a:xfrm>
+            <a:off x="2479050" y="1419113"/>
+            <a:ext cx="1223687" cy="1228725"/>
+          </a:xfrm>
+          <a:prstGeom prst="rect">
+            <a:avLst/>
+          </a:prstGeom>
+          <a:solidFill>
+            <a:schemeClr val="tx1"/>
+          </a:solidFill>
+          <a:ln w="28575">
+            <a:solidFill>
+              <a:schemeClr val="tx1"/>
+            </a:solidFill>
+          </a:ln>
+        </p:spPr>
+        <p:style>
+          <a:lnRef idx="2">
+            <a:schemeClr val="accent1">
+              <a:shade val="50000"/>
+            </a:schemeClr>
+          </a:lnRef>
+          <a:fillRef idx="1">
+            <a:schemeClr val="accent1"/>
+          </a:fillRef>
+          <a:effectRef idx="0">
+            <a:schemeClr val="accent1"/>
+          </a:effectRef>
+          <a:fontRef idx="minor">
+            <a:schemeClr val="lt1"/>
+          </a:fontRef>
+        </p:style>
+        <p:txBody>
+          <a:bodyPr rtlCol="0" anchor="ctr"/>
+          <a:lstStyle/>
+          <a:p>
+            <a:pPr algn="ctr"/>
+            <a:endParaRPr lang="en-GB"/>
+          </a:p>
+        </p:txBody>
+      </p:sp>
+      <p:cxnSp>
+        <p:nvCxnSpPr>
+          <p:cNvPr id="9" name="Straight Arrow Connector 8"/>
+          <p:cNvCxnSpPr>
+            <a:stCxn id="10" idx="3"/>
+          </p:cNvCxnSpPr>
+          <p:nvPr/>
+        </p:nvCxnSpPr>
+        <p:spPr>
+          <a:xfrm>
+            <a:off x="5004611" y="260576"/>
+            <a:ext cx="462739" cy="387124"/>
+          </a:xfrm>
+          <a:prstGeom prst="straightConnector1">
+            <a:avLst/>
+          </a:prstGeom>
+          <a:ln>
+            <a:tailEnd type="triangle"/>
+          </a:ln>
+        </p:spPr>
+        <p:style>
+          <a:lnRef idx="1">
+            <a:schemeClr val="dk1"/>
+          </a:lnRef>
+          <a:fillRef idx="0">
+            <a:schemeClr val="dk1"/>
+          </a:fillRef>
+          <a:effectRef idx="0">
+            <a:schemeClr val="dk1"/>
+          </a:effectRef>
+          <a:fontRef idx="minor">
+            <a:schemeClr val="tx1"/>
+          </a:fontRef>
+        </p:style>
+      </p:cxnSp>
+      <p:sp>
+        <p:nvSpPr>
+          <p:cNvPr id="10" name="TextBox 9"/>
+          <p:cNvSpPr txBox="1"/>
+          <p:nvPr/>
+        </p:nvSpPr>
+        <p:spPr>
+          <a:xfrm>
+            <a:off x="3947782" y="85725"/>
+            <a:ext cx="1056829" cy="349702"/>
+          </a:xfrm>
+          <a:prstGeom prst="rect">
+            <a:avLst/>
+          </a:prstGeom>
+          <a:noFill/>
+        </p:spPr>
+        <p:txBody>
+          <a:bodyPr wrap="none" lIns="0" tIns="36000" rIns="0" bIns="36000" rtlCol="0">
+            <a:spAutoFit/>
+          </a:bodyPr>
+          <a:lstStyle/>
+          <a:p>
+            <a:pPr algn="ctr"/>
+            <a:r>
+              <a:rPr lang="en-GB" b="1" dirty="0" err="1" smtClean="0"/>
+              <a:t>ScreenRect</a:t>
+            </a:r>
+            <a:endParaRPr lang="en-GB" b="1" dirty="0"/>
+          </a:p>
+        </p:txBody>
+      </p:sp>
+      <p:cxnSp>
+        <p:nvCxnSpPr>
+          <p:cNvPr id="12" name="Straight Arrow Connector 11"/>
+          <p:cNvCxnSpPr>
+            <a:stCxn id="13" idx="0"/>
+            <a:endCxn id="5" idx="2"/>
+          </p:cNvCxnSpPr>
+          <p:nvPr/>
+        </p:nvCxnSpPr>
+        <p:spPr>
+          <a:xfrm flipV="1">
+            <a:off x="2414863" y="2781300"/>
+            <a:ext cx="656950" cy="695325"/>
+          </a:xfrm>
+          <a:prstGeom prst="straightConnector1">
+            <a:avLst/>
+          </a:prstGeom>
+          <a:ln>
+            <a:tailEnd type="triangle"/>
+          </a:ln>
+        </p:spPr>
+        <p:style>
+          <a:lnRef idx="1">
+            <a:schemeClr val="dk1"/>
+          </a:lnRef>
+          <a:fillRef idx="0">
+            <a:schemeClr val="dk1"/>
+          </a:fillRef>
+          <a:effectRef idx="0">
+            <a:schemeClr val="dk1"/>
+          </a:effectRef>
+          <a:fontRef idx="minor">
+            <a:schemeClr val="tx1"/>
+          </a:fontRef>
+        </p:style>
+      </p:cxnSp>
+      <p:sp>
+        <p:nvSpPr>
+          <p:cNvPr id="13" name="TextBox 12"/>
+          <p:cNvSpPr txBox="1"/>
+          <p:nvPr/>
+        </p:nvSpPr>
+        <p:spPr>
+          <a:xfrm>
+            <a:off x="1400726" y="3476625"/>
+            <a:ext cx="2028273" cy="349702"/>
+          </a:xfrm>
+          <a:prstGeom prst="rect">
+            <a:avLst/>
+          </a:prstGeom>
+          <a:noFill/>
+        </p:spPr>
+        <p:txBody>
+          <a:bodyPr wrap="square" lIns="0" tIns="36000" rIns="0" bIns="36000" rtlCol="0">
+            <a:spAutoFit/>
+          </a:bodyPr>
+          <a:lstStyle/>
+          <a:p>
+            <a:pPr algn="ctr"/>
+            <a:r>
+              <a:rPr lang="en-GB" b="1" smtClean="0"/>
+              <a:t>ShapeContainer</a:t>
+            </a:r>
+            <a:r>
+              <a:rPr lang="en-GB" b="1"/>
+              <a:t>Rect</a:t>
+            </a:r>
+            <a:endParaRPr lang="en-GB" b="1" dirty="0"/>
+          </a:p>
+        </p:txBody>
+      </p:sp>
+      <p:cxnSp>
+        <p:nvCxnSpPr>
+          <p:cNvPr id="19" name="Straight Arrow Connector 18"/>
+          <p:cNvCxnSpPr>
+            <a:stCxn id="20" idx="1"/>
+            <a:endCxn id="2" idx="6"/>
+          </p:cNvCxnSpPr>
+          <p:nvPr/>
+        </p:nvCxnSpPr>
+        <p:spPr>
+          <a:xfrm flipH="1" flipV="1">
+            <a:off x="3702737" y="2035995"/>
+            <a:ext cx="1574664" cy="101119"/>
+          </a:xfrm>
+          <a:prstGeom prst="straightConnector1">
+            <a:avLst/>
+          </a:prstGeom>
+          <a:ln>
+            <a:tailEnd type="triangle"/>
+          </a:ln>
+        </p:spPr>
+        <p:style>
+          <a:lnRef idx="1">
+            <a:schemeClr val="dk1"/>
+          </a:lnRef>
+          <a:fillRef idx="0">
+            <a:schemeClr val="dk1"/>
+          </a:fillRef>
+          <a:effectRef idx="0">
+            <a:schemeClr val="dk1"/>
+          </a:effectRef>
+          <a:fontRef idx="minor">
+            <a:schemeClr val="tx1"/>
+          </a:fontRef>
+        </p:style>
+      </p:cxnSp>
+      <p:sp>
+        <p:nvSpPr>
+          <p:cNvPr id="20" name="TextBox 19"/>
+          <p:cNvSpPr txBox="1"/>
+          <p:nvPr/>
+        </p:nvSpPr>
+        <p:spPr>
+          <a:xfrm>
+            <a:off x="5277401" y="1962263"/>
+            <a:ext cx="1209123" cy="349702"/>
+          </a:xfrm>
+          <a:prstGeom prst="rect">
+            <a:avLst/>
+          </a:prstGeom>
+          <a:noFill/>
+        </p:spPr>
+        <p:txBody>
+          <a:bodyPr wrap="square" lIns="0" tIns="36000" rIns="0" bIns="36000" rtlCol="0">
+            <a:spAutoFit/>
+          </a:bodyPr>
+          <a:lstStyle/>
+          <a:p>
+            <a:pPr algn="ctr"/>
+            <a:r>
+              <a:rPr lang="en-GB" b="1" dirty="0" err="1" smtClean="0"/>
+              <a:t>ShapeRect</a:t>
+            </a:r>
+            <a:endParaRPr lang="en-GB" b="1" dirty="0"/>
+          </a:p>
+        </p:txBody>
+      </p:sp>
+      <p:sp>
+        <p:nvSpPr>
+          <p:cNvPr id="11" name="TextBox 10"/>
+          <p:cNvSpPr txBox="1"/>
+          <p:nvPr/>
+        </p:nvSpPr>
+        <p:spPr>
+          <a:xfrm>
+            <a:off x="714001" y="6348809"/>
+            <a:ext cx="2191497" cy="369332"/>
+          </a:xfrm>
+          <a:prstGeom prst="rect">
+            <a:avLst/>
+          </a:prstGeom>
+          <a:noFill/>
+        </p:spPr>
+        <p:txBody>
+          <a:bodyPr wrap="none" rtlCol="0">
+            <a:spAutoFit/>
+          </a:bodyPr>
+          <a:lstStyle/>
+          <a:p>
+            <a:r>
+              <a:rPr lang="en-GB" dirty="0" smtClean="0"/>
+              <a:t>See comments below</a:t>
+            </a:r>
+            <a:endParaRPr lang="en-GB" dirty="0"/>
+          </a:p>
+        </p:txBody>
+      </p:sp>
+      <p:sp>
+        <p:nvSpPr>
+          <p:cNvPr id="2" name="Oval 1"/>
+          <p:cNvSpPr/>
+          <p:nvPr/>
+        </p:nvSpPr>
+        <p:spPr>
+          <a:xfrm>
+            <a:off x="2479050" y="1424151"/>
+            <a:ext cx="1223687" cy="1223687"/>
+          </a:xfrm>
+          <a:prstGeom prst="ellipse">
+            <a:avLst/>
+          </a:prstGeom>
+        </p:spPr>
+        <p:style>
+          <a:lnRef idx="2">
+            <a:schemeClr val="accent1">
+              <a:shade val="50000"/>
+            </a:schemeClr>
+          </a:lnRef>
+          <a:fillRef idx="1">
+            <a:schemeClr val="accent1"/>
+          </a:fillRef>
+          <a:effectRef idx="0">
+            <a:schemeClr val="accent1"/>
+          </a:effectRef>
+          <a:fontRef idx="minor">
+            <a:schemeClr val="lt1"/>
+          </a:fontRef>
+        </p:style>
+        <p:txBody>
+          <a:bodyPr rtlCol="0" anchor="ctr"/>
+          <a:lstStyle/>
+          <a:p>
+            <a:pPr algn="ctr"/>
+            <a:endParaRPr lang="en-GB"/>
+          </a:p>
+        </p:txBody>
+      </p:sp>
+      <p:sp>
+        <p:nvSpPr>
+          <p:cNvPr id="14" name="Oval 13"/>
+          <p:cNvSpPr/>
+          <p:nvPr/>
+        </p:nvSpPr>
+        <p:spPr>
+          <a:xfrm>
+            <a:off x="2828925" y="1571625"/>
+            <a:ext cx="108000" cy="108000"/>
+          </a:xfrm>
+          <a:prstGeom prst="ellipse">
+            <a:avLst/>
+          </a:prstGeom>
+          <a:ln>
+            <a:noFill/>
+          </a:ln>
+        </p:spPr>
+        <p:style>
+          <a:lnRef idx="2">
+            <a:schemeClr val="dk1"/>
+          </a:lnRef>
+          <a:fillRef idx="1">
+            <a:schemeClr val="lt1"/>
+          </a:fillRef>
+          <a:effectRef idx="0">
+            <a:schemeClr val="dk1"/>
+          </a:effectRef>
+          <a:fontRef idx="minor">
+            <a:schemeClr val="dk1"/>
+          </a:fontRef>
+        </p:style>
+        <p:txBody>
+          <a:bodyPr rtlCol="0" anchor="ctr"/>
+          <a:lstStyle/>
+          <a:p>
+            <a:pPr algn="ctr"/>
+            <a:endParaRPr lang="en-GB"/>
+          </a:p>
+        </p:txBody>
+      </p:sp>
+    </p:spTree>
+    <p:extLst>
+      <p:ext uri="{BB962C8B-B14F-4D97-AF65-F5344CB8AC3E}">
+        <p14:creationId xmlns:p14="http://schemas.microsoft.com/office/powerpoint/2010/main" val="1877413773"/>
+      </p:ext>
+    </p:extLst>
+  </p:cSld>
+  <p:clrMapOvr>
+    <a:masterClrMapping/>
+  </p:clrMapOvr>
+</p:sld>
+</file>
+
 <file path=ppt/theme/theme1.xml><?xml version="1.0" encoding="utf-8"?>
 <a:theme xmlns:a="http://schemas.openxmlformats.org/drawingml/2006/main" name="Office Theme">
   <a:themeElements>

</xml_diff>